<commit_message>
Reviewed lecture 13 notes (fixed typos et al.)
</commit_message>
<xml_diff>
--- a/Lectures/Lecture 13_Probability.pptx
+++ b/Lectures/Lecture 13_Probability.pptx
@@ -270,7 +270,7 @@
           <a:p>
             <a:fld id="{1271C461-7B3B-E741-925E-CE7B76E12C21}" type="datetimeFigureOut">
               <a:rPr lang="en-US" smtClean="0"/>
-              <a:t>10/10/23</a:t>
+              <a:t>10/24/23</a:t>
             </a:fld>
             <a:endParaRPr lang="en-US"/>
           </a:p>
@@ -436,7 +436,7 @@
             <a:fld id="{1E00213A-4496-8E41-939D-6D779164903A}" type="datetimeFigureOut">
               <a:rPr lang="en-US" smtClean="0"/>
               <a:pPr/>
-              <a:t>10/10/23</a:t>
+              <a:t>10/24/23</a:t>
             </a:fld>
             <a:endParaRPr lang="en-US"/>
           </a:p>
@@ -1858,7 +1858,7 @@
             <a:fld id="{7B6FE768-D535-DB4F-A86D-18423950C428}" type="datetimeFigureOut">
               <a:rPr lang="en-US" smtClean="0"/>
               <a:pPr/>
-              <a:t>10/10/23</a:t>
+              <a:t>10/24/23</a:t>
             </a:fld>
             <a:endParaRPr lang="en-US"/>
           </a:p>
@@ -2050,7 +2050,7 @@
             <a:fld id="{7B6FE768-D535-DB4F-A86D-18423950C428}" type="datetimeFigureOut">
               <a:rPr lang="en-US" smtClean="0"/>
               <a:pPr/>
-              <a:t>10/10/23</a:t>
+              <a:t>10/24/23</a:t>
             </a:fld>
             <a:endParaRPr lang="en-US"/>
           </a:p>
@@ -2236,7 +2236,7 @@
             <a:fld id="{7B6FE768-D535-DB4F-A86D-18423950C428}" type="datetimeFigureOut">
               <a:rPr lang="en-US" smtClean="0"/>
               <a:pPr/>
-              <a:t>10/10/23</a:t>
+              <a:t>10/24/23</a:t>
             </a:fld>
             <a:endParaRPr lang="en-US"/>
           </a:p>
@@ -2500,7 +2500,7 @@
             <a:fld id="{7B6FE768-D535-DB4F-A86D-18423950C428}" type="datetimeFigureOut">
               <a:rPr lang="en-US" smtClean="0"/>
               <a:pPr/>
-              <a:t>10/10/23</a:t>
+              <a:t>10/24/23</a:t>
             </a:fld>
             <a:endParaRPr lang="en-US"/>
           </a:p>
@@ -2917,7 +2917,7 @@
             <a:fld id="{7B6FE768-D535-DB4F-A86D-18423950C428}" type="datetimeFigureOut">
               <a:rPr lang="en-US" smtClean="0"/>
               <a:pPr/>
-              <a:t>10/10/23</a:t>
+              <a:t>10/24/23</a:t>
             </a:fld>
             <a:endParaRPr lang="en-US"/>
           </a:p>
@@ -3160,7 +3160,7 @@
             <a:fld id="{7B6FE768-D535-DB4F-A86D-18423950C428}" type="datetimeFigureOut">
               <a:rPr lang="en-US" smtClean="0"/>
               <a:pPr/>
-              <a:t>10/10/23</a:t>
+              <a:t>10/24/23</a:t>
             </a:fld>
             <a:endParaRPr lang="en-US"/>
           </a:p>
@@ -3397,7 +3397,7 @@
             <a:fld id="{7B6FE768-D535-DB4F-A86D-18423950C428}" type="datetimeFigureOut">
               <a:rPr lang="en-US" smtClean="0"/>
               <a:pPr/>
-              <a:t>10/10/23</a:t>
+              <a:t>10/24/23</a:t>
             </a:fld>
             <a:endParaRPr lang="en-US"/>
           </a:p>
@@ -3593,7 +3593,7 @@
             <a:fld id="{7B6FE768-D535-DB4F-A86D-18423950C428}" type="datetimeFigureOut">
               <a:rPr lang="en-US" smtClean="0"/>
               <a:pPr/>
-              <a:t>10/10/23</a:t>
+              <a:t>10/24/23</a:t>
             </a:fld>
             <a:endParaRPr lang="en-US"/>
           </a:p>
@@ -3693,7 +3693,7 @@
             <a:fld id="{7B6FE768-D535-DB4F-A86D-18423950C428}" type="datetimeFigureOut">
               <a:rPr lang="en-US" smtClean="0"/>
               <a:pPr/>
-              <a:t>10/10/23</a:t>
+              <a:t>10/24/23</a:t>
             </a:fld>
             <a:endParaRPr lang="en-US"/>
           </a:p>
@@ -3830,7 +3830,7 @@
             <a:fld id="{7B6FE768-D535-DB4F-A86D-18423950C428}" type="datetimeFigureOut">
               <a:rPr lang="en-US" smtClean="0"/>
               <a:pPr/>
-              <a:t>10/10/23</a:t>
+              <a:t>10/24/23</a:t>
             </a:fld>
             <a:endParaRPr lang="en-US"/>
           </a:p>
@@ -4349,7 +4349,7 @@
             <a:fld id="{7B6FE768-D535-DB4F-A86D-18423950C428}" type="datetimeFigureOut">
               <a:rPr lang="en-US" smtClean="0"/>
               <a:pPr/>
-              <a:t>10/10/23</a:t>
+              <a:t>10/24/23</a:t>
             </a:fld>
             <a:endParaRPr lang="en-US"/>
           </a:p>
@@ -4610,7 +4610,7 @@
             <a:fld id="{7B6FE768-D535-DB4F-A86D-18423950C428}" type="datetimeFigureOut">
               <a:rPr lang="en-US" smtClean="0"/>
               <a:pPr/>
-              <a:t>10/10/23</a:t>
+              <a:t>10/24/23</a:t>
             </a:fld>
             <a:endParaRPr lang="en-US"/>
           </a:p>
@@ -7511,7 +7511,7 @@
                       <a:noFill/>
                       <a:extLst>
                         <a:ext uri="{909E8E84-426E-40dd-AFC4-6F175D3DCCD1}">
-                          <a14:hiddenFill xmlns="" xmlns:a14="http://schemas.microsoft.com/office/drawing/2010/main">
+                          <a14:hiddenFill xmlns:a14="http://schemas.microsoft.com/office/drawing/2010/main" xmlns="">
                             <a:solidFill>
                               <a:srgbClr val="FFFFFF"/>
                             </a:solidFill>
@@ -8418,7 +8418,7 @@
                       <a:noFill/>
                       <a:extLst>
                         <a:ext uri="{909E8E84-426E-40dd-AFC4-6F175D3DCCD1}">
-                          <a14:hiddenFill xmlns="" xmlns:a14="http://schemas.microsoft.com/office/drawing/2010/main">
+                          <a14:hiddenFill xmlns:a14="http://schemas.microsoft.com/office/drawing/2010/main" xmlns="">
                             <a:solidFill>
                               <a:srgbClr val="FFFFFF"/>
                             </a:solidFill>
@@ -8903,23 +8903,7 @@
                   <a:srgbClr val="FF0000"/>
                 </a:solidFill>
               </a:rPr>
-              <a:t>In terms of </a:t>
-            </a:r>
-            <a:r>
-              <a:rPr lang="en-US" sz="2400" dirty="0" err="1">
-                <a:solidFill>
-                  <a:srgbClr val="FF0000"/>
-                </a:solidFill>
-              </a:rPr>
-              <a:t>pior</a:t>
-            </a:r>
-            <a:r>
-              <a:rPr lang="en-US" sz="2400" dirty="0">
-                <a:solidFill>
-                  <a:srgbClr val="FF0000"/>
-                </a:solidFill>
-              </a:rPr>
-              <a:t> and joint distributions, what is the conditional probability distribution?</a:t>
+              <a:t>In terms of prior and joint distributions, what is the conditional probability distribution?</a:t>
             </a:r>
           </a:p>
         </p:txBody>
@@ -9028,7 +9012,7 @@
                       <a:noFill/>
                       <a:extLst>
                         <a:ext uri="{909E8E84-426E-40dd-AFC4-6F175D3DCCD1}">
-                          <a14:hiddenFill xmlns="" xmlns:a14="http://schemas.microsoft.com/office/drawing/2010/main">
+                          <a14:hiddenFill xmlns:a14="http://schemas.microsoft.com/office/drawing/2010/main" xmlns="">
                             <a:solidFill>
                               <a:srgbClr val="FFFFFF"/>
                             </a:solidFill>
@@ -9595,39 +9579,7 @@
                   <a:srgbClr val="0000FF"/>
                 </a:solidFill>
               </a:rPr>
-              <a:t>Given that </a:t>
-            </a:r>
-            <a:r>
-              <a:rPr lang="en-US" sz="2400" dirty="0" err="1">
-                <a:solidFill>
-                  <a:srgbClr val="0000FF"/>
-                </a:solidFill>
-              </a:rPr>
-              <a:t>y</a:t>
-            </a:r>
-            <a:r>
-              <a:rPr lang="en-US" sz="2400" dirty="0">
-                <a:solidFill>
-                  <a:srgbClr val="0000FF"/>
-                </a:solidFill>
-              </a:rPr>
-              <a:t> has happened, what proportion of those events does </a:t>
-            </a:r>
-            <a:r>
-              <a:rPr lang="en-US" sz="2400" dirty="0" err="1">
-                <a:solidFill>
-                  <a:srgbClr val="0000FF"/>
-                </a:solidFill>
-              </a:rPr>
-              <a:t>x</a:t>
-            </a:r>
-            <a:r>
-              <a:rPr lang="en-US" sz="2400" dirty="0">
-                <a:solidFill>
-                  <a:srgbClr val="0000FF"/>
-                </a:solidFill>
-              </a:rPr>
-              <a:t> also happen  </a:t>
+              <a:t>Given that y has happened, what proportion of those events does x also happen?  </a:t>
             </a:r>
           </a:p>
         </p:txBody>
@@ -10098,7 +10050,7 @@
                       <a:noFill/>
                       <a:extLst>
                         <a:ext uri="{909E8E84-426E-40dd-AFC4-6F175D3DCCD1}">
-                          <a14:hiddenFill xmlns="" xmlns:a14="http://schemas.microsoft.com/office/drawing/2010/main">
+                          <a14:hiddenFill xmlns:a14="http://schemas.microsoft.com/office/drawing/2010/main" xmlns="">
                             <a:solidFill>
                               <a:srgbClr val="FFFFFF"/>
                             </a:solidFill>
@@ -10738,7 +10690,7 @@
                       <a:noFill/>
                       <a:extLst>
                         <a:ext uri="{909E8E84-426E-40dd-AFC4-6F175D3DCCD1}">
-                          <a14:hiddenFill xmlns="" xmlns:a14="http://schemas.microsoft.com/office/drawing/2010/main">
+                          <a14:hiddenFill xmlns:a14="http://schemas.microsoft.com/office/drawing/2010/main" xmlns="">
                             <a:solidFill>
                               <a:srgbClr val="FFFFFF"/>
                             </a:solidFill>
@@ -11138,7 +11090,7 @@
                       <a:noFill/>
                       <a:extLst>
                         <a:ext uri="{909E8E84-426E-40dd-AFC4-6F175D3DCCD1}">
-                          <a14:hiddenFill xmlns="" xmlns:a14="http://schemas.microsoft.com/office/drawing/2010/main">
+                          <a14:hiddenFill xmlns:a14="http://schemas.microsoft.com/office/drawing/2010/main" xmlns="">
                             <a:solidFill>
                               <a:srgbClr val="FFFFFF"/>
                             </a:solidFill>
@@ -11264,7 +11216,7 @@
                       <a:noFill/>
                       <a:extLst>
                         <a:ext uri="{909E8E84-426E-40dd-AFC4-6F175D3DCCD1}">
-                          <a14:hiddenFill xmlns="" xmlns:a14="http://schemas.microsoft.com/office/drawing/2010/main">
+                          <a14:hiddenFill xmlns:a14="http://schemas.microsoft.com/office/drawing/2010/main" xmlns="">
                             <a:solidFill>
                               <a:srgbClr val="FFFFFF"/>
                             </a:solidFill>
@@ -11549,7 +11501,7 @@
                       <a:noFill/>
                       <a:extLst>
                         <a:ext uri="{909E8E84-426E-40dd-AFC4-6F175D3DCCD1}">
-                          <a14:hiddenFill xmlns="" xmlns:a14="http://schemas.microsoft.com/office/drawing/2010/main">
+                          <a14:hiddenFill xmlns:a14="http://schemas.microsoft.com/office/drawing/2010/main" xmlns="">
                             <a:solidFill>
                               <a:srgbClr val="FFFFFF"/>
                             </a:solidFill>
@@ -11654,7 +11606,7 @@
                       <a:noFill/>
                       <a:extLst>
                         <a:ext uri="{909E8E84-426E-40dd-AFC4-6F175D3DCCD1}">
-                          <a14:hiddenFill xmlns="" xmlns:a14="http://schemas.microsoft.com/office/drawing/2010/main">
+                          <a14:hiddenFill xmlns:a14="http://schemas.microsoft.com/office/drawing/2010/main" xmlns="">
                             <a:solidFill>
                               <a:srgbClr val="FFFFFF"/>
                             </a:solidFill>
@@ -12324,7 +12276,7 @@
                       <a:noFill/>
                       <a:extLst>
                         <a:ext uri="{909E8E84-426E-40dd-AFC4-6F175D3DCCD1}">
-                          <a14:hiddenFill xmlns="" xmlns:a14="http://schemas.microsoft.com/office/drawing/2010/main">
+                          <a14:hiddenFill xmlns:a14="http://schemas.microsoft.com/office/drawing/2010/main" xmlns="">
                             <a:solidFill>
                               <a:srgbClr val="FFFFFF"/>
                             </a:solidFill>
@@ -12394,7 +12346,7 @@
                       <a:noFill/>
                       <a:extLst>
                         <a:ext uri="{909E8E84-426E-40dd-AFC4-6F175D3DCCD1}">
-                          <a14:hiddenFill xmlns="" xmlns:a14="http://schemas.microsoft.com/office/drawing/2010/main">
+                          <a14:hiddenFill xmlns:a14="http://schemas.microsoft.com/office/drawing/2010/main" xmlns="">
                             <a:solidFill>
                               <a:srgbClr val="FFFFFF"/>
                             </a:solidFill>
@@ -13190,7 +13142,7 @@
                       <a:noFill/>
                       <a:extLst>
                         <a:ext uri="{909E8E84-426E-40dd-AFC4-6F175D3DCCD1}">
-                          <a14:hiddenFill xmlns="" xmlns:a14="http://schemas.microsoft.com/office/drawing/2010/main">
+                          <a14:hiddenFill xmlns:a14="http://schemas.microsoft.com/office/drawing/2010/main" xmlns="">
                             <a:solidFill>
                               <a:srgbClr val="FFFFFF"/>
                             </a:solidFill>
@@ -13308,7 +13260,7 @@
                       <a:noFill/>
                       <a:extLst>
                         <a:ext uri="{909E8E84-426E-40dd-AFC4-6F175D3DCCD1}">
-                          <a14:hiddenFill xmlns="" xmlns:a14="http://schemas.microsoft.com/office/drawing/2010/main">
+                          <a14:hiddenFill xmlns:a14="http://schemas.microsoft.com/office/drawing/2010/main" xmlns="">
                             <a:solidFill>
                               <a:srgbClr val="FFFFFF"/>
                             </a:solidFill>
@@ -13378,7 +13330,7 @@
                       <a:noFill/>
                       <a:extLst>
                         <a:ext uri="{909E8E84-426E-40dd-AFC4-6F175D3DCCD1}">
-                          <a14:hiddenFill xmlns="" xmlns:a14="http://schemas.microsoft.com/office/drawing/2010/main">
+                          <a14:hiddenFill xmlns:a14="http://schemas.microsoft.com/office/drawing/2010/main" xmlns="">
                             <a:solidFill>
                               <a:srgbClr val="FFFFFF"/>
                             </a:solidFill>
@@ -13741,7 +13693,7 @@
                       <a:noFill/>
                       <a:extLst>
                         <a:ext uri="{909E8E84-426E-40dd-AFC4-6F175D3DCCD1}">
-                          <a14:hiddenFill xmlns="" xmlns:a14="http://schemas.microsoft.com/office/drawing/2010/main">
+                          <a14:hiddenFill xmlns:a14="http://schemas.microsoft.com/office/drawing/2010/main" xmlns="">
                             <a:solidFill>
                               <a:srgbClr val="FFFFFF"/>
                             </a:solidFill>
@@ -13811,7 +13763,7 @@
                       <a:noFill/>
                       <a:extLst>
                         <a:ext uri="{909E8E84-426E-40dd-AFC4-6F175D3DCCD1}">
-                          <a14:hiddenFill xmlns="" xmlns:a14="http://schemas.microsoft.com/office/drawing/2010/main">
+                          <a14:hiddenFill xmlns:a14="http://schemas.microsoft.com/office/drawing/2010/main" xmlns="">
                             <a:solidFill>
                               <a:srgbClr val="FFFFFF"/>
                             </a:solidFill>
@@ -13881,7 +13833,7 @@
                       <a:noFill/>
                       <a:extLst>
                         <a:ext uri="{909E8E84-426E-40dd-AFC4-6F175D3DCCD1}">
-                          <a14:hiddenFill xmlns="" xmlns:a14="http://schemas.microsoft.com/office/drawing/2010/main">
+                          <a14:hiddenFill xmlns:a14="http://schemas.microsoft.com/office/drawing/2010/main" xmlns="">
                             <a:solidFill>
                               <a:srgbClr val="FFFFFF"/>
                             </a:solidFill>
@@ -13951,7 +13903,7 @@
                       <a:noFill/>
                       <a:extLst>
                         <a:ext uri="{909E8E84-426E-40dd-AFC4-6F175D3DCCD1}">
-                          <a14:hiddenFill xmlns="" xmlns:a14="http://schemas.microsoft.com/office/drawing/2010/main">
+                          <a14:hiddenFill xmlns:a14="http://schemas.microsoft.com/office/drawing/2010/main" xmlns="">
                             <a:solidFill>
                               <a:srgbClr val="FFFFFF"/>
                             </a:solidFill>
@@ -14295,7 +14247,7 @@
                       <a:noFill/>
                       <a:extLst>
                         <a:ext uri="{909E8E84-426E-40dd-AFC4-6F175D3DCCD1}">
-                          <a14:hiddenFill xmlns="" xmlns:a14="http://schemas.microsoft.com/office/drawing/2010/main">
+                          <a14:hiddenFill xmlns:a14="http://schemas.microsoft.com/office/drawing/2010/main" xmlns="">
                             <a:solidFill>
                               <a:srgbClr val="FFFFFF"/>
                             </a:solidFill>
@@ -14365,7 +14317,7 @@
                       <a:noFill/>
                       <a:extLst>
                         <a:ext uri="{909E8E84-426E-40dd-AFC4-6F175D3DCCD1}">
-                          <a14:hiddenFill xmlns="" xmlns:a14="http://schemas.microsoft.com/office/drawing/2010/main">
+                          <a14:hiddenFill xmlns:a14="http://schemas.microsoft.com/office/drawing/2010/main" xmlns="">
                             <a:solidFill>
                               <a:srgbClr val="FFFFFF"/>
                             </a:solidFill>
@@ -14581,7 +14533,7 @@
                         <a:noFill/>
                         <a:extLst>
                           <a:ext uri="{909E8E84-426E-40dd-AFC4-6F175D3DCCD1}">
-                            <a14:hiddenFill xmlns="" xmlns:a14="http://schemas.microsoft.com/office/drawing/2010/main">
+                            <a14:hiddenFill xmlns:a14="http://schemas.microsoft.com/office/drawing/2010/main" xmlns="">
                               <a:solidFill>
                                 <a:srgbClr val="FFFFFF"/>
                               </a:solidFill>
@@ -14657,7 +14609,7 @@
                         <a:noFill/>
                         <a:extLst>
                           <a:ext uri="{909E8E84-426E-40dd-AFC4-6F175D3DCCD1}">
-                            <a14:hiddenFill xmlns="" xmlns:a14="http://schemas.microsoft.com/office/drawing/2010/main">
+                            <a14:hiddenFill xmlns:a14="http://schemas.microsoft.com/office/drawing/2010/main" xmlns="">
                               <a:solidFill>
                                 <a:srgbClr val="FFFFFF"/>
                               </a:solidFill>
@@ -14798,7 +14750,7 @@
                         <a:noFill/>
                         <a:extLst>
                           <a:ext uri="{909E8E84-426E-40dd-AFC4-6F175D3DCCD1}">
-                            <a14:hiddenFill xmlns="" xmlns:a14="http://schemas.microsoft.com/office/drawing/2010/main">
+                            <a14:hiddenFill xmlns:a14="http://schemas.microsoft.com/office/drawing/2010/main" xmlns="">
                               <a:solidFill>
                                 <a:srgbClr val="FFFFFF"/>
                               </a:solidFill>
@@ -14874,7 +14826,7 @@
                         <a:noFill/>
                         <a:extLst>
                           <a:ext uri="{909E8E84-426E-40dd-AFC4-6F175D3DCCD1}">
-                            <a14:hiddenFill xmlns="" xmlns:a14="http://schemas.microsoft.com/office/drawing/2010/main">
+                            <a14:hiddenFill xmlns:a14="http://schemas.microsoft.com/office/drawing/2010/main" xmlns="">
                               <a:solidFill>
                                 <a:srgbClr val="FFFFFF"/>
                               </a:solidFill>
@@ -15010,7 +14962,7 @@
                       <a:noFill/>
                       <a:extLst>
                         <a:ext uri="{909E8E84-426E-40dd-AFC4-6F175D3DCCD1}">
-                          <a14:hiddenFill xmlns="" xmlns:a14="http://schemas.microsoft.com/office/drawing/2010/main">
+                          <a14:hiddenFill xmlns:a14="http://schemas.microsoft.com/office/drawing/2010/main" xmlns="">
                             <a:solidFill>
                               <a:srgbClr val="FFFFFF"/>
                             </a:solidFill>
@@ -15329,7 +15281,7 @@
                       <a:noFill/>
                       <a:extLst>
                         <a:ext uri="{909E8E84-426E-40dd-AFC4-6F175D3DCCD1}">
-                          <a14:hiddenFill xmlns="" xmlns:a14="http://schemas.microsoft.com/office/drawing/2010/main">
+                          <a14:hiddenFill xmlns:a14="http://schemas.microsoft.com/office/drawing/2010/main" xmlns="">
                             <a:solidFill>
                               <a:srgbClr val="FFFFFF"/>
                             </a:solidFill>
@@ -15604,7 +15556,7 @@
                   <a:srgbClr val="775F55"/>
                 </a:solidFill>
               </a:rPr>
-              <a:t>p( label| features )</a:t>
+              <a:t>p(label| features )</a:t>
             </a:r>
           </a:p>
           <a:p>
@@ -18606,7 +18558,7 @@
                       <a:noFill/>
                       <a:extLst>
                         <a:ext uri="{909E8E84-426E-40dd-AFC4-6F175D3DCCD1}">
-                          <a14:hiddenFill xmlns="" xmlns:a14="http://schemas.microsoft.com/office/drawing/2010/main">
+                          <a14:hiddenFill xmlns:a14="http://schemas.microsoft.com/office/drawing/2010/main" xmlns="">
                             <a:solidFill>
                               <a:srgbClr val="FFFFFF"/>
                             </a:solidFill>
@@ -19022,7 +18974,7 @@
                       <a:noFill/>
                       <a:extLst>
                         <a:ext uri="{909E8E84-426E-40dd-AFC4-6F175D3DCCD1}">
-                          <a14:hiddenFill xmlns="" xmlns:a14="http://schemas.microsoft.com/office/drawing/2010/main">
+                          <a14:hiddenFill xmlns:a14="http://schemas.microsoft.com/office/drawing/2010/main" xmlns="">
                             <a:solidFill>
                               <a:srgbClr val="FFFFFF"/>
                             </a:solidFill>
@@ -19092,7 +19044,7 @@
                       <a:noFill/>
                       <a:extLst>
                         <a:ext uri="{909E8E84-426E-40dd-AFC4-6F175D3DCCD1}">
-                          <a14:hiddenFill xmlns="" xmlns:a14="http://schemas.microsoft.com/office/drawing/2010/main">
+                          <a14:hiddenFill xmlns:a14="http://schemas.microsoft.com/office/drawing/2010/main" xmlns="">
                             <a:solidFill>
                               <a:srgbClr val="FFFFFF"/>
                             </a:solidFill>
@@ -19162,7 +19114,7 @@
                       <a:noFill/>
                       <a:extLst>
                         <a:ext uri="{909E8E84-426E-40dd-AFC4-6F175D3DCCD1}">
-                          <a14:hiddenFill xmlns="" xmlns:a14="http://schemas.microsoft.com/office/drawing/2010/main">
+                          <a14:hiddenFill xmlns:a14="http://schemas.microsoft.com/office/drawing/2010/main" xmlns="">
                             <a:solidFill>
                               <a:srgbClr val="FFFFFF"/>
                             </a:solidFill>
@@ -19248,7 +19200,7 @@
                   <a:srgbClr val="FF0000"/>
                 </a:solidFill>
               </a:rPr>
-              <a:t>Suppose we run it on a sentence and the algorithm says it is a parasitic gap, what is the probability it actually is?</a:t>
+              <a:t>Suppose we run it on a sentence and the algorithm says it is a parasitic gap, what is the probability it actually has a parasitic gap?</a:t>
             </a:r>
           </a:p>
         </p:txBody>
@@ -19359,7 +19311,7 @@
                       <a:noFill/>
                       <a:extLst>
                         <a:ext uri="{909E8E84-426E-40dd-AFC4-6F175D3DCCD1}">
-                          <a14:hiddenFill xmlns="" xmlns:a14="http://schemas.microsoft.com/office/drawing/2010/main">
+                          <a14:hiddenFill xmlns:a14="http://schemas.microsoft.com/office/drawing/2010/main" xmlns="">
                             <a:solidFill>
                               <a:srgbClr val="FFFFFF"/>
                             </a:solidFill>
@@ -19464,7 +19416,7 @@
                       <a:noFill/>
                       <a:extLst>
                         <a:ext uri="{909E8E84-426E-40dd-AFC4-6F175D3DCCD1}">
-                          <a14:hiddenFill xmlns="" xmlns:a14="http://schemas.microsoft.com/office/drawing/2010/main">
+                          <a14:hiddenFill xmlns:a14="http://schemas.microsoft.com/office/drawing/2010/main" xmlns="">
                             <a:solidFill>
                               <a:srgbClr val="FFFFFF"/>
                             </a:solidFill>
@@ -24406,7 +24358,7 @@
                 </a:solidFill>
                 <a:ea typeface="ＭＳ Ｐゴシック" charset="-128"/>
               </a:rPr>
-              <a:t>An example, i.e. a particular setting of feature values</a:t>
+              <a:t>An example, i.e., a particular setting of feature values</a:t>
             </a:r>
           </a:p>
           <a:p>
@@ -24500,7 +24452,7 @@
             </a:pPr>
             <a:r>
               <a:rPr lang="en-US" dirty="0"/>
-              <a:t>Which model do we use, i.e. how do we calculate p(</a:t>
+              <a:t>Which model do we use, i.e., how do we calculate p(</a:t>
             </a:r>
             <a:r>
               <a:rPr lang="en-US" i="1" dirty="0"/>
@@ -24523,7 +24475,7 @@
             </a:pPr>
             <a:r>
               <a:rPr lang="en-US" dirty="0"/>
-              <a:t>How do train the model, i.e. how do we we </a:t>
+              <a:t>How do train the model, i.e., how do we we </a:t>
             </a:r>
             <a:r>
               <a:rPr lang="en-US" dirty="0">
@@ -24550,15 +24502,7 @@
             </a:pPr>
             <a:r>
               <a:rPr lang="en-US" dirty="0"/>
-              <a:t>How do we deal with </a:t>
-            </a:r>
-            <a:r>
-              <a:rPr lang="en-US" dirty="0" err="1"/>
-              <a:t>overfitting</a:t>
-            </a:r>
-            <a:r>
-              <a:rPr lang="en-US" dirty="0"/>
-              <a:t>?</a:t>
+              <a:t>How do we deal with overfitting?</a:t>
             </a:r>
           </a:p>
           <a:p>
@@ -24655,7 +24599,7 @@
             </a:pPr>
             <a:r>
               <a:rPr lang="en-US" dirty="0"/>
-              <a:t>Which model do we use, i.e. how do we calculate p(</a:t>
+              <a:t>Which model do we use, i.e., how do we calculate p(</a:t>
             </a:r>
             <a:r>
               <a:rPr lang="en-US" i="1" dirty="0"/>
@@ -24678,7 +24622,7 @@
             </a:pPr>
             <a:r>
               <a:rPr lang="en-US" dirty="0"/>
-              <a:t>How do train the model, i.e. how to we we </a:t>
+              <a:t>How to train the model, i.e., how do we </a:t>
             </a:r>
             <a:r>
               <a:rPr lang="en-US" dirty="0">
@@ -24705,15 +24649,7 @@
             </a:pPr>
             <a:r>
               <a:rPr lang="en-US" dirty="0"/>
-              <a:t>How do we deal with </a:t>
-            </a:r>
-            <a:r>
-              <a:rPr lang="en-US" dirty="0" err="1"/>
-              <a:t>overfitting</a:t>
-            </a:r>
-            <a:r>
-              <a:rPr lang="en-US" dirty="0"/>
-              <a:t>?</a:t>
+              <a:t>How do we deal with overfitting?</a:t>
             </a:r>
           </a:p>
           <a:p>
@@ -25017,7 +24953,7 @@
             </a:pPr>
             <a:r>
               <a:rPr lang="en-US" sz="2400" dirty="0"/>
-              <a:t>Which model do we use (decision tree, linear model, non-parametric)</a:t>
+              <a:t>Which model do we use (decision tree, linear model, non-parametric)?</a:t>
             </a:r>
           </a:p>
           <a:p>
@@ -25034,7 +24970,7 @@
             </a:pPr>
             <a:r>
               <a:rPr lang="en-US" sz="2400" dirty="0"/>
-              <a:t>How do train the model?</a:t>
+              <a:t>How to train the model?</a:t>
             </a:r>
           </a:p>
           <a:p>
@@ -25058,15 +24994,7 @@
             </a:pPr>
             <a:r>
               <a:rPr lang="en-US" sz="2400" dirty="0"/>
-              <a:t>How do we deal with </a:t>
-            </a:r>
-            <a:r>
-              <a:rPr lang="en-US" sz="2400" dirty="0" err="1"/>
-              <a:t>overfitting</a:t>
-            </a:r>
-            <a:r>
-              <a:rPr lang="en-US" sz="2400" dirty="0"/>
-              <a:t>?</a:t>
+              <a:t>How do we deal with overfitting?</a:t>
             </a:r>
           </a:p>
           <a:p>
@@ -25164,7 +25092,7 @@
             </a:pPr>
             <a:r>
               <a:rPr lang="en-US" dirty="0"/>
-              <a:t>Which model do we use, i.e. how do we calculate p(</a:t>
+              <a:t>Which model do we use, i.e., how do we calculate p(</a:t>
             </a:r>
             <a:r>
               <a:rPr lang="en-US" i="1" dirty="0"/>
@@ -25187,7 +25115,7 @@
             </a:pPr>
             <a:r>
               <a:rPr lang="en-US" dirty="0"/>
-              <a:t>How do train the model, i.e. how to we we </a:t>
+              <a:t>How do train the model, i.e., how to we we </a:t>
             </a:r>
             <a:r>
               <a:rPr lang="en-US" dirty="0">
@@ -27972,7 +27900,7 @@
                   <a:srgbClr val="FF0000"/>
                 </a:solidFill>
               </a:rPr>
-              <a:t>How many entries would the probability distribution table have if we tried to represent all possible values (e.g. for the wine data set)?</a:t>
+              <a:t>How many entries would the probability distribution table have if we tried to represent all possible values (e.g., for the wine data set)?</a:t>
             </a:r>
           </a:p>
         </p:txBody>

</xml_diff>